<commit_message>
Modified report and presentation.
</commit_message>
<xml_diff>
--- a/CpE301_presentation.pptx
+++ b/CpE301_presentation.pptx
@@ -244,7 +244,7 @@
           <a:p>
             <a:fld id="{638D90FF-A81E-754F-A570-0F4520BDAFF0}" type="datetimeFigureOut">
               <a:rPr lang="en-US" smtClean="0"/>
-              <a:t>5/10/2016</a:t>
+              <a:t>5/11/2016</a:t>
             </a:fld>
             <a:endParaRPr lang="en-US"/>
           </a:p>
@@ -434,7 +434,7 @@
           <a:p>
             <a:fld id="{638D90FF-A81E-754F-A570-0F4520BDAFF0}" type="datetimeFigureOut">
               <a:rPr lang="en-US" smtClean="0"/>
-              <a:t>5/10/2016</a:t>
+              <a:t>5/11/2016</a:t>
             </a:fld>
             <a:endParaRPr lang="en-US"/>
           </a:p>
@@ -629,7 +629,7 @@
           <a:p>
             <a:fld id="{638D90FF-A81E-754F-A570-0F4520BDAFF0}" type="datetimeFigureOut">
               <a:rPr lang="en-US" smtClean="0"/>
-              <a:t>5/10/2016</a:t>
+              <a:t>5/11/2016</a:t>
             </a:fld>
             <a:endParaRPr lang="en-US"/>
           </a:p>
@@ -886,7 +886,7 @@
           <a:p>
             <a:fld id="{638D90FF-A81E-754F-A570-0F4520BDAFF0}" type="datetimeFigureOut">
               <a:rPr lang="en-US" smtClean="0"/>
-              <a:t>5/10/2016</a:t>
+              <a:t>5/11/2016</a:t>
             </a:fld>
             <a:endParaRPr lang="en-US"/>
           </a:p>
@@ -1153,7 +1153,7 @@
           <a:p>
             <a:fld id="{638D90FF-A81E-754F-A570-0F4520BDAFF0}" type="datetimeFigureOut">
               <a:rPr lang="en-US" smtClean="0"/>
-              <a:t>5/10/2016</a:t>
+              <a:t>5/11/2016</a:t>
             </a:fld>
             <a:endParaRPr lang="en-US"/>
           </a:p>
@@ -1348,7 +1348,7 @@
           <a:p>
             <a:fld id="{638D90FF-A81E-754F-A570-0F4520BDAFF0}" type="datetimeFigureOut">
               <a:rPr lang="en-US" smtClean="0"/>
-              <a:t>5/10/2016</a:t>
+              <a:t>5/11/2016</a:t>
             </a:fld>
             <a:endParaRPr lang="en-US"/>
           </a:p>
@@ -1555,7 +1555,7 @@
           <a:p>
             <a:fld id="{638D90FF-A81E-754F-A570-0F4520BDAFF0}" type="datetimeFigureOut">
               <a:rPr lang="en-US" smtClean="0"/>
-              <a:t>5/10/2016</a:t>
+              <a:t>5/11/2016</a:t>
             </a:fld>
             <a:endParaRPr lang="en-US"/>
           </a:p>
@@ -1858,7 +1858,7 @@
           <a:p>
             <a:fld id="{638D90FF-A81E-754F-A570-0F4520BDAFF0}" type="datetimeFigureOut">
               <a:rPr lang="en-US" smtClean="0"/>
-              <a:t>5/10/2016</a:t>
+              <a:t>5/11/2016</a:t>
             </a:fld>
             <a:endParaRPr lang="en-US"/>
           </a:p>
@@ -2300,7 +2300,7 @@
           <a:p>
             <a:fld id="{638D90FF-A81E-754F-A570-0F4520BDAFF0}" type="datetimeFigureOut">
               <a:rPr lang="en-US" smtClean="0"/>
-              <a:t>5/10/2016</a:t>
+              <a:t>5/11/2016</a:t>
             </a:fld>
             <a:endParaRPr lang="en-US"/>
           </a:p>
@@ -2433,7 +2433,7 @@
           <a:p>
             <a:fld id="{638D90FF-A81E-754F-A570-0F4520BDAFF0}" type="datetimeFigureOut">
               <a:rPr lang="en-US" smtClean="0"/>
-              <a:t>5/10/2016</a:t>
+              <a:t>5/11/2016</a:t>
             </a:fld>
             <a:endParaRPr lang="en-US"/>
           </a:p>
@@ -2543,7 +2543,7 @@
           <a:p>
             <a:fld id="{638D90FF-A81E-754F-A570-0F4520BDAFF0}" type="datetimeFigureOut">
               <a:rPr lang="en-US" smtClean="0"/>
-              <a:t>5/10/2016</a:t>
+              <a:t>5/11/2016</a:t>
             </a:fld>
             <a:endParaRPr lang="en-US"/>
           </a:p>
@@ -2835,7 +2835,7 @@
           <a:p>
             <a:fld id="{638D90FF-A81E-754F-A570-0F4520BDAFF0}" type="datetimeFigureOut">
               <a:rPr lang="en-US" smtClean="0"/>
-              <a:t>5/10/2016</a:t>
+              <a:t>5/11/2016</a:t>
             </a:fld>
             <a:endParaRPr lang="en-US"/>
           </a:p>
@@ -3107,7 +3107,7 @@
           <a:p>
             <a:fld id="{638D90FF-A81E-754F-A570-0F4520BDAFF0}" type="datetimeFigureOut">
               <a:rPr lang="en-US" smtClean="0"/>
-              <a:t>5/10/2016</a:t>
+              <a:t>5/11/2016</a:t>
             </a:fld>
             <a:endParaRPr lang="en-US"/>
           </a:p>
@@ -3273,17 +3273,17 @@
           <a:effectLst/>
           <a:extLst>
             <a:ext uri="{FAA26D3D-D897-4be2-8F04-BA451C77F1D7}">
-              <ma14:placeholderFlag xmlns:ma14="http://schemas.microsoft.com/office/mac/drawingml/2011/main" xmlns="" val="1"/>
+              <ma14:placeholderFlag xmlns="" xmlns:ma14="http://schemas.microsoft.com/office/mac/drawingml/2011/main" val="1"/>
             </a:ext>
             <a:ext uri="{909E8E84-426E-40dd-AFC4-6F175D3DCCD1}">
-              <a14:hiddenFill xmlns="" xmlns:a14="http://schemas.microsoft.com/office/drawing/2010/main">
+              <a14:hiddenFill xmlns:a14="http://schemas.microsoft.com/office/drawing/2010/main" xmlns="">
                 <a:solidFill>
                   <a:schemeClr val="accent1"/>
                 </a:solidFill>
               </a14:hiddenFill>
             </a:ext>
             <a:ext uri="{91240B29-F687-4f45-9708-019B960494DF}">
-              <a14:hiddenLine xmlns="" xmlns:a14="http://schemas.microsoft.com/office/drawing/2010/main" w="9525">
+              <a14:hiddenLine xmlns:a14="http://schemas.microsoft.com/office/drawing/2010/main" xmlns="" w="9525">
                 <a:solidFill>
                   <a:schemeClr val="tx1"/>
                 </a:solidFill>
@@ -3293,7 +3293,7 @@
               </a14:hiddenLine>
             </a:ext>
             <a:ext uri="{AF507438-7753-43e0-B8FC-AC1667EBCBE1}">
-              <a14:hiddenEffects xmlns="" xmlns:a14="http://schemas.microsoft.com/office/drawing/2010/main">
+              <a14:hiddenEffects xmlns:a14="http://schemas.microsoft.com/office/drawing/2010/main" xmlns="">
                 <a:effectLst>
                   <a:outerShdw blurRad="63500" dist="38099" dir="2700000" algn="ctr" rotWithShape="0">
                     <a:schemeClr val="bg2">
@@ -3375,17 +3375,17 @@
           <a:effectLst/>
           <a:extLst>
             <a:ext uri="{FAA26D3D-D897-4be2-8F04-BA451C77F1D7}">
-              <ma14:placeholderFlag xmlns:ma14="http://schemas.microsoft.com/office/mac/drawingml/2011/main" xmlns="" val="1"/>
+              <ma14:placeholderFlag xmlns="" xmlns:ma14="http://schemas.microsoft.com/office/mac/drawingml/2011/main" val="1"/>
             </a:ext>
             <a:ext uri="{909E8E84-426E-40dd-AFC4-6F175D3DCCD1}">
-              <a14:hiddenFill xmlns="" xmlns:a14="http://schemas.microsoft.com/office/drawing/2010/main">
+              <a14:hiddenFill xmlns:a14="http://schemas.microsoft.com/office/drawing/2010/main" xmlns="">
                 <a:solidFill>
                   <a:schemeClr val="accent1"/>
                 </a:solidFill>
               </a14:hiddenFill>
             </a:ext>
             <a:ext uri="{91240B29-F687-4f45-9708-019B960494DF}">
-              <a14:hiddenLine xmlns="" xmlns:a14="http://schemas.microsoft.com/office/drawing/2010/main" w="9525">
+              <a14:hiddenLine xmlns:a14="http://schemas.microsoft.com/office/drawing/2010/main" xmlns="" w="9525">
                 <a:solidFill>
                   <a:schemeClr val="tx1"/>
                 </a:solidFill>
@@ -3395,7 +3395,7 @@
               </a14:hiddenLine>
             </a:ext>
             <a:ext uri="{AF507438-7753-43e0-B8FC-AC1667EBCBE1}">
-              <a14:hiddenEffects xmlns="" xmlns:a14="http://schemas.microsoft.com/office/drawing/2010/main">
+              <a14:hiddenEffects xmlns:a14="http://schemas.microsoft.com/office/drawing/2010/main" xmlns="">
                 <a:effectLst>
                   <a:outerShdw blurRad="63500" dist="38099" dir="2700000" algn="ctr" rotWithShape="0">
                     <a:schemeClr val="bg2">
@@ -3449,17 +3449,17 @@
           <a:effectLst/>
           <a:extLst>
             <a:ext uri="{FAA26D3D-D897-4be2-8F04-BA451C77F1D7}">
-              <ma14:placeholderFlag xmlns:ma14="http://schemas.microsoft.com/office/mac/drawingml/2011/main" xmlns="" val="1"/>
+              <ma14:placeholderFlag xmlns="" xmlns:ma14="http://schemas.microsoft.com/office/mac/drawingml/2011/main" val="1"/>
             </a:ext>
             <a:ext uri="{909E8E84-426E-40dd-AFC4-6F175D3DCCD1}">
-              <a14:hiddenFill xmlns="" xmlns:a14="http://schemas.microsoft.com/office/drawing/2010/main">
+              <a14:hiddenFill xmlns:a14="http://schemas.microsoft.com/office/drawing/2010/main" xmlns="">
                 <a:solidFill>
                   <a:schemeClr val="accent1"/>
                 </a:solidFill>
               </a14:hiddenFill>
             </a:ext>
             <a:ext uri="{91240B29-F687-4f45-9708-019B960494DF}">
-              <a14:hiddenLine xmlns="" xmlns:a14="http://schemas.microsoft.com/office/drawing/2010/main" w="9525">
+              <a14:hiddenLine xmlns:a14="http://schemas.microsoft.com/office/drawing/2010/main" xmlns="" w="9525">
                 <a:solidFill>
                   <a:schemeClr val="tx1"/>
                 </a:solidFill>
@@ -3469,7 +3469,7 @@
               </a14:hiddenLine>
             </a:ext>
             <a:ext uri="{AF507438-7753-43e0-B8FC-AC1667EBCBE1}">
-              <a14:hiddenEffects xmlns="" xmlns:a14="http://schemas.microsoft.com/office/drawing/2010/main">
+              <a14:hiddenEffects xmlns:a14="http://schemas.microsoft.com/office/drawing/2010/main" xmlns="">
                 <a:effectLst>
                   <a:outerShdw blurRad="63500" dist="38099" dir="2700000" algn="ctr" rotWithShape="0">
                     <a:schemeClr val="bg2">
@@ -3499,7 +3499,7 @@
           <a:p>
             <a:fld id="{638D90FF-A81E-754F-A570-0F4520BDAFF0}" type="datetimeFigureOut">
               <a:rPr lang="en-US" smtClean="0"/>
-              <a:t>5/10/2016</a:t>
+              <a:t>5/11/2016</a:t>
             </a:fld>
             <a:endParaRPr lang="en-US"/>
           </a:p>
@@ -3530,17 +3530,17 @@
           <a:effectLst/>
           <a:extLst>
             <a:ext uri="{FAA26D3D-D897-4be2-8F04-BA451C77F1D7}">
-              <ma14:placeholderFlag xmlns:ma14="http://schemas.microsoft.com/office/mac/drawingml/2011/main" xmlns="" val="1"/>
+              <ma14:placeholderFlag xmlns="" xmlns:ma14="http://schemas.microsoft.com/office/mac/drawingml/2011/main" val="1"/>
             </a:ext>
             <a:ext uri="{909E8E84-426E-40dd-AFC4-6F175D3DCCD1}">
-              <a14:hiddenFill xmlns="" xmlns:a14="http://schemas.microsoft.com/office/drawing/2010/main">
+              <a14:hiddenFill xmlns:a14="http://schemas.microsoft.com/office/drawing/2010/main" xmlns="">
                 <a:solidFill>
                   <a:schemeClr val="accent1"/>
                 </a:solidFill>
               </a14:hiddenFill>
             </a:ext>
             <a:ext uri="{91240B29-F687-4f45-9708-019B960494DF}">
-              <a14:hiddenLine xmlns="" xmlns:a14="http://schemas.microsoft.com/office/drawing/2010/main" w="9525">
+              <a14:hiddenLine xmlns:a14="http://schemas.microsoft.com/office/drawing/2010/main" xmlns="" w="9525">
                 <a:solidFill>
                   <a:schemeClr val="tx1"/>
                 </a:solidFill>
@@ -3550,7 +3550,7 @@
               </a14:hiddenLine>
             </a:ext>
             <a:ext uri="{AF507438-7753-43e0-B8FC-AC1667EBCBE1}">
-              <a14:hiddenEffects xmlns="" xmlns:a14="http://schemas.microsoft.com/office/drawing/2010/main">
+              <a14:hiddenEffects xmlns:a14="http://schemas.microsoft.com/office/drawing/2010/main" xmlns="">
                 <a:effectLst>
                   <a:outerShdw blurRad="63500" dist="38099" dir="2700000" algn="ctr" rotWithShape="0">
                     <a:schemeClr val="bg2">
@@ -3607,17 +3607,17 @@
           <a:effectLst/>
           <a:extLst>
             <a:ext uri="{FAA26D3D-D897-4be2-8F04-BA451C77F1D7}">
-              <ma14:placeholderFlag xmlns:ma14="http://schemas.microsoft.com/office/mac/drawingml/2011/main" xmlns="" val="1"/>
+              <ma14:placeholderFlag xmlns="" xmlns:ma14="http://schemas.microsoft.com/office/mac/drawingml/2011/main" val="1"/>
             </a:ext>
             <a:ext uri="{909E8E84-426E-40dd-AFC4-6F175D3DCCD1}">
-              <a14:hiddenFill xmlns="" xmlns:a14="http://schemas.microsoft.com/office/drawing/2010/main">
+              <a14:hiddenFill xmlns:a14="http://schemas.microsoft.com/office/drawing/2010/main" xmlns="">
                 <a:solidFill>
                   <a:schemeClr val="accent1"/>
                 </a:solidFill>
               </a14:hiddenFill>
             </a:ext>
             <a:ext uri="{91240B29-F687-4f45-9708-019B960494DF}">
-              <a14:hiddenLine xmlns="" xmlns:a14="http://schemas.microsoft.com/office/drawing/2010/main" w="9525">
+              <a14:hiddenLine xmlns:a14="http://schemas.microsoft.com/office/drawing/2010/main" xmlns="" w="9525">
                 <a:solidFill>
                   <a:schemeClr val="tx1"/>
                 </a:solidFill>
@@ -3627,7 +3627,7 @@
               </a14:hiddenLine>
             </a:ext>
             <a:ext uri="{AF507438-7753-43e0-B8FC-AC1667EBCBE1}">
-              <a14:hiddenEffects xmlns="" xmlns:a14="http://schemas.microsoft.com/office/drawing/2010/main">
+              <a14:hiddenEffects xmlns:a14="http://schemas.microsoft.com/office/drawing/2010/main" xmlns="">
                 <a:effectLst>
                   <a:outerShdw blurRad="63500" dist="38099" dir="2700000" algn="ctr" rotWithShape="0">
                     <a:schemeClr val="bg2">
@@ -4094,11 +4094,7 @@
           <a:p>
             <a:r>
               <a:rPr lang="en-US" dirty="0" smtClean="0"/>
-              <a:t>CPE 301 </a:t>
-            </a:r>
-            <a:r>
-              <a:rPr lang="en-US" dirty="0" smtClean="0"/>
-              <a:t>Publish Compass</a:t>
+              <a:t>CPE 301 Publish Compass</a:t>
             </a:r>
             <a:endParaRPr lang="en-US" dirty="0"/>
           </a:p>
@@ -4123,16 +4119,11 @@
               <a:rPr lang="en-US" dirty="0" smtClean="0"/>
               <a:t>Martin Jaime</a:t>
             </a:r>
-            <a:endParaRPr lang="en-US" dirty="0" smtClean="0"/>
           </a:p>
           <a:p>
             <a:r>
               <a:rPr lang="en-US" dirty="0" smtClean="0"/>
-              <a:t>Email</a:t>
-            </a:r>
-            <a:r>
-              <a:rPr lang="en-US" dirty="0" smtClean="0"/>
-              <a:t>: jaimem5@unlv.nevada.edu</a:t>
+              <a:t>Email: jaimem5@unlv.nevada.edu</a:t>
             </a:r>
             <a:endParaRPr lang="en-US" dirty="0"/>
           </a:p>
@@ -4151,6 +4142,13 @@
   <p:transition spd="med">
     <p:wipe dir="d"/>
   </p:transition>
+  <p:timing>
+    <p:tnLst>
+      <p:par>
+        <p:cTn id="1" dur="indefinite" restart="never" nodeType="tmRoot"/>
+      </p:par>
+    </p:tnLst>
+  </p:timing>
 </p:sld>
 </file>
 
@@ -4253,30 +4251,9 @@
               <a:rPr lang="en-US" dirty="0" smtClean="0"/>
               <a:t>Publish data to ThingSpeak.com with ESP8266.</a:t>
             </a:r>
-            <a:endParaRPr lang="en-US" dirty="0" smtClean="0"/>
-          </a:p>
-          <a:p>
-            <a:pPr marL="457200" indent="-457200">
-              <a:buAutoNum type="arabicPeriod"/>
-            </a:pPr>
-            <a:endParaRPr lang="en-US" dirty="0" smtClean="0"/>
-          </a:p>
-          <a:p>
-            <a:pPr marL="457200" indent="-457200">
-              <a:buAutoNum type="arabicPeriod"/>
-            </a:pPr>
-            <a:endParaRPr lang="en-US" dirty="0"/>
-          </a:p>
-          <a:p>
-            <a:pPr marL="457200" indent="-457200">
-              <a:buAutoNum type="arabicPeriod"/>
-            </a:pPr>
-            <a:endParaRPr lang="en-US" dirty="0" smtClean="0"/>
-          </a:p>
-          <a:p>
-            <a:pPr marL="457200" indent="-457200">
-              <a:buAutoNum type="arabicPeriod"/>
-            </a:pPr>
+          </a:p>
+          <a:p>
+            <a:pPr marL="0" indent="0"/>
             <a:endParaRPr lang="en-US" dirty="0"/>
           </a:p>
           <a:p>
@@ -4299,12 +4276,51 @@
               <a:rPr lang="en-US" dirty="0" smtClean="0"/>
               <a:t> device that publishes data to the cloud. </a:t>
             </a:r>
+          </a:p>
+          <a:p>
+            <a:pPr marL="0" indent="0"/>
             <a:endParaRPr lang="en-US" dirty="0" smtClean="0"/>
           </a:p>
           <a:p>
+            <a:pPr marL="0" indent="0"/>
+            <a:r>
+              <a:rPr lang="en-US" b="1" u="sng" dirty="0" smtClean="0"/>
+              <a:t>IMPLEMENTATION</a:t>
+            </a:r>
+          </a:p>
+          <a:p>
             <a:pPr marL="457200" indent="-457200">
+              <a:buFont typeface="+mj-lt"/>
               <a:buAutoNum type="arabicPeriod"/>
             </a:pPr>
+            <a:r>
+              <a:rPr lang="en-US" dirty="0" smtClean="0"/>
+              <a:t>Robotics</a:t>
+            </a:r>
+          </a:p>
+          <a:p>
+            <a:pPr marL="457200" indent="-457200">
+              <a:buFont typeface="+mj-lt"/>
+              <a:buAutoNum type="arabicPeriod"/>
+            </a:pPr>
+            <a:r>
+              <a:rPr lang="en-US" dirty="0" smtClean="0"/>
+              <a:t>Mobile devices</a:t>
+            </a:r>
+          </a:p>
+          <a:p>
+            <a:pPr marL="457200" indent="-457200">
+              <a:buFont typeface="+mj-lt"/>
+              <a:buAutoNum type="arabicPeriod"/>
+            </a:pPr>
+            <a:endParaRPr lang="en-US" dirty="0"/>
+          </a:p>
+          <a:p>
+            <a:pPr marL="0" indent="0"/>
+            <a:endParaRPr lang="en-US" dirty="0"/>
+          </a:p>
+          <a:p>
+            <a:pPr marL="0" indent="0"/>
             <a:endParaRPr lang="en-US" dirty="0"/>
           </a:p>
         </p:txBody>
@@ -4322,6 +4338,13 @@
   <p:transition spd="med">
     <p:wipe dir="d"/>
   </p:transition>
+  <p:timing>
+    <p:tnLst>
+      <p:par>
+        <p:cTn id="1" dur="indefinite" restart="never" nodeType="tmRoot"/>
+      </p:par>
+    </p:tnLst>
+  </p:timing>
 </p:sld>
 </file>
 
@@ -4410,6 +4433,13 @@
   <p:transition spd="med">
     <p:wipe dir="d"/>
   </p:transition>
+  <p:timing>
+    <p:tnLst>
+      <p:par>
+        <p:cTn id="1" dur="indefinite" restart="never" nodeType="tmRoot"/>
+      </p:par>
+    </p:tnLst>
+  </p:timing>
 </p:sld>
 </file>
 
@@ -4473,7 +4503,6 @@
               <a:rPr lang="en-US" sz="2300" b="1" u="sng" dirty="0" smtClean="0"/>
               <a:t>Main Components </a:t>
             </a:r>
-            <a:endParaRPr lang="en-US" sz="2300" b="1" u="sng" dirty="0" smtClean="0"/>
           </a:p>
           <a:p>
             <a:pPr marL="457200" indent="-457200">
@@ -4543,13 +4572,8 @@
             </a:r>
             <a:r>
               <a:rPr lang="en-US" sz="2300" dirty="0" smtClean="0"/>
-              <a:t>C – Address (</a:t>
-            </a:r>
-            <a:r>
-              <a:rPr lang="en-US" sz="2300" dirty="0" smtClean="0"/>
-              <a:t>0x3C)</a:t>
-            </a:r>
-            <a:endParaRPr lang="en-US" sz="2300" dirty="0" smtClean="0"/>
+              <a:t>C – Address (0x3C)</a:t>
+            </a:r>
           </a:p>
           <a:p>
             <a:pPr marL="457200" indent="-457200">
@@ -4581,11 +4605,7 @@
             </a:r>
             <a:r>
               <a:rPr lang="en-US" sz="2300" b="1" u="sng" dirty="0" smtClean="0"/>
-              <a:t> </a:t>
-            </a:r>
-            <a:r>
-              <a:rPr lang="en-US" sz="2300" b="1" u="sng" dirty="0" smtClean="0"/>
-              <a:t>: </a:t>
+              <a:t> : </a:t>
             </a:r>
             <a:r>
               <a:rPr lang="en-US" sz="2300" dirty="0" smtClean="0"/>
@@ -4608,6 +4628,13 @@
   <p:transition spd="med">
     <p:wipe dir="d"/>
   </p:transition>
+  <p:timing>
+    <p:tnLst>
+      <p:par>
+        <p:cTn id="1" dur="indefinite" restart="never" nodeType="tmRoot"/>
+      </p:par>
+    </p:tnLst>
+  </p:timing>
 </p:sld>
 </file>
 
@@ -4700,11 +4727,7 @@
             </a:pPr>
             <a:r>
               <a:rPr lang="en-US" sz="2200" dirty="0" smtClean="0"/>
-              <a:t>Init</a:t>
-            </a:r>
-            <a:r>
-              <a:rPr lang="en-US" sz="2200" dirty="0" smtClean="0"/>
-              <a:t>ialize HMC5882L for continuous acquisition at 15Hz</a:t>
+              <a:t>Initialize HMC5882L for continuous acquisition at 15Hz</a:t>
             </a:r>
             <a:endParaRPr lang="en-US" sz="2200" dirty="0"/>
           </a:p>
@@ -4734,11 +4757,7 @@
             </a:pPr>
             <a:r>
               <a:rPr lang="en-US" sz="2200" dirty="0" smtClean="0"/>
-              <a:t>Data </a:t>
-            </a:r>
-            <a:r>
-              <a:rPr lang="en-US" sz="2200" dirty="0" smtClean="0"/>
-              <a:t>Collection</a:t>
+              <a:t>Data Collection</a:t>
             </a:r>
           </a:p>
           <a:p>
@@ -4786,6 +4805,13 @@
   <p:transition spd="med">
     <p:wipe dir="d"/>
   </p:transition>
+  <p:timing>
+    <p:tnLst>
+      <p:par>
+        <p:cTn id="1" dur="indefinite" restart="never" nodeType="tmRoot"/>
+      </p:par>
+    </p:tnLst>
+  </p:timing>
 </p:sld>
 </file>
 
@@ -4825,19 +4851,35 @@
               <a:rPr lang="en-US" dirty="0"/>
               <a:t>OIT/Visualization</a:t>
             </a:r>
-            <a:endParaRPr lang="en-US" dirty="0"/>
+          </a:p>
+        </p:txBody>
+      </p:sp>
+      <p:sp>
+        <p:nvSpPr>
+          <p:cNvPr id="5" name="Content Placeholder 4"/>
+          <p:cNvSpPr>
+            <a:spLocks noGrp="1"/>
+          </p:cNvSpPr>
+          <p:nvPr>
+            <p:ph idx="1"/>
+          </p:nvPr>
+        </p:nvSpPr>
+        <p:spPr/>
+        <p:txBody>
+          <a:bodyPr/>
+          <a:lstStyle/>
+          <a:p>
+            <a:endParaRPr lang="en-US"/>
           </a:p>
         </p:txBody>
       </p:sp>
       <p:pic>
         <p:nvPicPr>
-          <p:cNvPr id="4" name="Content Placeholder 3"/>
+          <p:cNvPr id="6" name="Picture 5"/>
           <p:cNvPicPr>
-            <a:picLocks noGrp="1" noChangeAspect="1"/>
+            <a:picLocks noChangeAspect="1"/>
           </p:cNvPicPr>
-          <p:nvPr>
-            <p:ph idx="1"/>
-          </p:nvPr>
+          <p:nvPr/>
         </p:nvPicPr>
         <p:blipFill>
           <a:blip r:embed="rId2"/>
@@ -4847,8 +4889,8 @@
         </p:blipFill>
         <p:spPr>
           <a:xfrm>
-            <a:off x="577972" y="1380227"/>
-            <a:ext cx="7865941" cy="4054415"/>
+            <a:off x="485059" y="1604513"/>
+            <a:ext cx="8154650" cy="3657600"/>
           </a:xfrm>
           <a:prstGeom prst="rect">
             <a:avLst/>
@@ -4868,6 +4910,13 @@
   <p:transition spd="med">
     <p:wipe dir="d"/>
   </p:transition>
+  <p:timing>
+    <p:tnLst>
+      <p:par>
+        <p:cTn id="1" dur="indefinite" restart="never" nodeType="tmRoot"/>
+      </p:par>
+    </p:tnLst>
+  </p:timing>
 </p:sld>
 </file>
 
@@ -4911,29 +4960,33 @@
           </a:p>
         </p:txBody>
       </p:sp>
-      <p:sp>
-        <p:nvSpPr>
-          <p:cNvPr id="3" name="Content Placeholder 2"/>
-          <p:cNvSpPr>
-            <a:spLocks noGrp="1"/>
-          </p:cNvSpPr>
+      <p:pic>
+        <p:nvPicPr>
+          <p:cNvPr id="4" name="KmEt1JfSFaw"/>
+          <p:cNvPicPr>
+            <a:picLocks noGrp="1" noRot="1" noChangeAspect="1"/>
+          </p:cNvPicPr>
           <p:nvPr>
             <p:ph idx="1"/>
-          </p:nvPr>
-        </p:nvSpPr>
-        <p:spPr/>
-        <p:txBody>
-          <a:bodyPr/>
-          <a:lstStyle/>
-          <a:p>
-            <a:r>
-              <a:rPr lang="en-US" dirty="0" smtClean="0"/>
-              <a:t>Embed demo video</a:t>
-            </a:r>
-            <a:endParaRPr lang="en-US" dirty="0"/>
-          </a:p>
-        </p:txBody>
-      </p:sp>
+            <a:videoFile r:link="rId1"/>
+          </p:nvPr>
+        </p:nvPicPr>
+        <p:blipFill>
+          <a:blip r:embed="rId3"/>
+          <a:stretch>
+            <a:fillRect/>
+          </a:stretch>
+        </p:blipFill>
+        <p:spPr>
+          <a:xfrm>
+            <a:off x="434226" y="1104181"/>
+            <a:ext cx="8250687" cy="4641011"/>
+          </a:xfrm>
+          <a:prstGeom prst="rect">
+            <a:avLst/>
+          </a:prstGeom>
+        </p:spPr>
+      </p:pic>
     </p:spTree>
     <p:extLst>
       <p:ext uri="{BB962C8B-B14F-4D97-AF65-F5344CB8AC3E}">
@@ -4947,6 +5000,13 @@
   <p:transition spd="med">
     <p:wipe dir="d"/>
   </p:transition>
+  <p:timing>
+    <p:tnLst>
+      <p:par>
+        <p:cTn id="1" dur="indefinite" restart="never" nodeType="tmRoot"/>
+      </p:par>
+    </p:tnLst>
+  </p:timing>
 </p:sld>
 </file>
 

</xml_diff>